<commit_message>
Updating README.md and ppt
</commit_message>
<xml_diff>
--- a/TopInstagramAnalysis_ProjectReport.pptx
+++ b/TopInstagramAnalysis_ProjectReport.pptx
@@ -9601,7 +9601,7 @@
         </p:nvSpPr>
         <p:spPr>
           <a:xfrm>
-            <a:off x="7025232" y="463974"/>
+            <a:off x="6727058" y="613061"/>
             <a:ext cx="4217424" cy="3709195"/>
           </a:xfrm>
         </p:spPr>
@@ -9639,7 +9639,7 @@
         </p:nvSpPr>
         <p:spPr>
           <a:xfrm>
-            <a:off x="7025232" y="4363278"/>
+            <a:off x="6727058" y="4512365"/>
             <a:ext cx="3249608" cy="369332"/>
           </a:xfrm>
           <a:prstGeom prst="rect">
@@ -9731,6 +9731,12 @@
           <a:prstGeom prst="rect">
             <a:avLst/>
           </a:prstGeom>
+          <a:ln>
+            <a:noFill/>
+          </a:ln>
+          <a:effectLst>
+            <a:softEdge rad="112500"/>
+          </a:effectLst>
         </p:spPr>
       </p:pic>
     </p:spTree>
@@ -9822,8 +9828,8 @@
         </p:nvSpPr>
         <p:spPr>
           <a:xfrm>
-            <a:off x="2329068" y="480487"/>
-            <a:ext cx="7361583" cy="675861"/>
+            <a:off x="298175" y="400974"/>
+            <a:ext cx="11559208" cy="675861"/>
           </a:xfrm>
         </p:spPr>
         <p:txBody>
@@ -9832,6 +9838,7 @@
           </a:bodyPr>
           <a:lstStyle/>
           <a:p>
+            <a:pPr algn="ctr"/>
             <a:r>
               <a:rPr lang="en-US" dirty="0"/>
               <a:t>Influencers Count by Country</a:t>
@@ -9878,7 +9885,11 @@
             <a:noFill/>
           </a:ln>
           <a:effectLst>
-            <a:softEdge rad="112500"/>
+            <a:outerShdw blurRad="190500" algn="tl" rotWithShape="0">
+              <a:srgbClr val="000000">
+                <a:alpha val="70000"/>
+              </a:srgbClr>
+            </a:outerShdw>
           </a:effectLst>
         </p:spPr>
       </p:pic>
@@ -9971,8 +9982,8 @@
         </p:nvSpPr>
         <p:spPr>
           <a:xfrm>
-            <a:off x="2837621" y="450670"/>
-            <a:ext cx="6516757" cy="675861"/>
+            <a:off x="318053" y="400974"/>
+            <a:ext cx="11529390" cy="675861"/>
           </a:xfrm>
         </p:spPr>
         <p:txBody>
@@ -9981,6 +9992,7 @@
           </a:bodyPr>
           <a:lstStyle/>
           <a:p>
+            <a:pPr algn="ctr"/>
             <a:r>
               <a:rPr lang="en-US" dirty="0"/>
               <a:t>Influence Score by Country</a:t>
@@ -10016,12 +10028,22 @@
         </p:blipFill>
         <p:spPr>
           <a:xfrm>
-            <a:off x="1721643" y="1282148"/>
+            <a:off x="1708391" y="1212574"/>
             <a:ext cx="8748714" cy="5045669"/>
           </a:xfrm>
           <a:prstGeom prst="rect">
             <a:avLst/>
           </a:prstGeom>
+          <a:ln>
+            <a:noFill/>
+          </a:ln>
+          <a:effectLst>
+            <a:outerShdw blurRad="190500" algn="tl" rotWithShape="0">
+              <a:srgbClr val="000000">
+                <a:alpha val="70000"/>
+              </a:srgbClr>
+            </a:outerShdw>
+          </a:effectLst>
         </p:spPr>
       </p:pic>
     </p:spTree>
@@ -11069,6 +11091,16 @@
           <a:prstGeom prst="rect">
             <a:avLst/>
           </a:prstGeom>
+          <a:ln>
+            <a:noFill/>
+          </a:ln>
+          <a:effectLst>
+            <a:outerShdw blurRad="190500" algn="tl" rotWithShape="0">
+              <a:srgbClr val="000000">
+                <a:alpha val="70000"/>
+              </a:srgbClr>
+            </a:outerShdw>
+          </a:effectLst>
         </p:spPr>
       </p:pic>
     </p:spTree>
@@ -11215,7 +11247,7 @@
         </p:nvSpPr>
         <p:spPr>
           <a:xfrm>
-            <a:off x="5637287" y="932842"/>
+            <a:off x="5671113" y="868956"/>
             <a:ext cx="5673444" cy="5358628"/>
           </a:xfrm>
           <a:prstGeom prst="rect">
@@ -11224,7 +11256,7 @@
         </p:spPr>
         <p:txBody>
           <a:bodyPr>
-            <a:normAutofit fontScale="77500" lnSpcReduction="20000"/>
+            <a:normAutofit fontScale="85000" lnSpcReduction="20000"/>
           </a:bodyPr>
           <a:lstStyle>
             <a:lvl1pPr marL="228600" indent="-228600" algn="l" defTabSz="914400" rtl="0" eaLnBrk="1" latinLnBrk="0" hangingPunct="1">
@@ -11392,6 +11424,9 @@
           </a:lstStyle>
           <a:p>
             <a:pPr marL="0" indent="0">
+              <a:spcBef>
+                <a:spcPts val="600"/>
+              </a:spcBef>
               <a:buNone/>
             </a:pPr>
             <a:r>
@@ -11401,11 +11436,19 @@
           </a:p>
           <a:p>
             <a:pPr marL="0" indent="0">
+              <a:spcBef>
+                <a:spcPts val="600"/>
+              </a:spcBef>
               <a:buNone/>
             </a:pPr>
             <a:endParaRPr lang="en-US" sz="2300" b="1" dirty="0"/>
           </a:p>
           <a:p>
+            <a:pPr>
+              <a:spcBef>
+                <a:spcPts val="600"/>
+              </a:spcBef>
+            </a:pPr>
             <a:r>
               <a:rPr lang="en-US" sz="2300" b="1" dirty="0"/>
               <a:t>rank</a:t>
@@ -11416,6 +11459,11 @@
             </a:r>
           </a:p>
           <a:p>
+            <a:pPr>
+              <a:spcBef>
+                <a:spcPts val="600"/>
+              </a:spcBef>
+            </a:pPr>
             <a:r>
               <a:rPr lang="en-US" sz="2300" b="1" dirty="0"/>
               <a:t>channel_info</a:t>
@@ -11426,6 +11474,11 @@
             </a:r>
           </a:p>
           <a:p>
+            <a:pPr>
+              <a:spcBef>
+                <a:spcPts val="600"/>
+              </a:spcBef>
+            </a:pPr>
             <a:r>
               <a:rPr lang="en-US" sz="2300" b="1" dirty="0"/>
               <a:t>influence_score</a:t>
@@ -11436,6 +11489,11 @@
             </a:r>
           </a:p>
           <a:p>
+            <a:pPr>
+              <a:spcBef>
+                <a:spcPts val="600"/>
+              </a:spcBef>
+            </a:pPr>
             <a:r>
               <a:rPr lang="en-US" sz="2300" b="1" dirty="0"/>
               <a:t>posts</a:t>
@@ -11446,6 +11504,11 @@
             </a:r>
           </a:p>
           <a:p>
+            <a:pPr>
+              <a:spcBef>
+                <a:spcPts val="600"/>
+              </a:spcBef>
+            </a:pPr>
             <a:r>
               <a:rPr lang="en-US" sz="2300" b="1" dirty="0"/>
               <a:t>followers</a:t>
@@ -11456,6 +11519,11 @@
             </a:r>
           </a:p>
           <a:p>
+            <a:pPr>
+              <a:spcBef>
+                <a:spcPts val="600"/>
+              </a:spcBef>
+            </a:pPr>
             <a:r>
               <a:rPr lang="en-US" sz="2300" b="1" dirty="0"/>
               <a:t>avg_likes</a:t>
@@ -11466,6 +11534,11 @@
             </a:r>
           </a:p>
           <a:p>
+            <a:pPr>
+              <a:spcBef>
+                <a:spcPts val="600"/>
+              </a:spcBef>
+            </a:pPr>
             <a:r>
               <a:rPr lang="en-US" sz="2300" b="1" dirty="0"/>
               <a:t>60_day_eng_rate</a:t>
@@ -11476,6 +11549,11 @@
             </a:r>
           </a:p>
           <a:p>
+            <a:pPr>
+              <a:spcBef>
+                <a:spcPts val="600"/>
+              </a:spcBef>
+            </a:pPr>
             <a:r>
               <a:rPr lang="en-US" sz="2300" b="1" dirty="0"/>
               <a:t>new_post_avg_like</a:t>
@@ -11486,6 +11564,11 @@
             </a:r>
           </a:p>
           <a:p>
+            <a:pPr>
+              <a:spcBef>
+                <a:spcPts val="600"/>
+              </a:spcBef>
+            </a:pPr>
             <a:r>
               <a:rPr lang="en-US" sz="2300" b="1" dirty="0"/>
               <a:t>total_likes</a:t>
@@ -11496,6 +11579,11 @@
             </a:r>
           </a:p>
           <a:p>
+            <a:pPr>
+              <a:spcBef>
+                <a:spcPts val="600"/>
+              </a:spcBef>
+            </a:pPr>
             <a:r>
               <a:rPr lang="en-US" sz="2300" b="1" dirty="0"/>
               <a:t>country</a:t>
@@ -11555,8 +11643,8 @@
         </p:nvSpPr>
         <p:spPr>
           <a:xfrm>
-            <a:off x="6496306" y="590033"/>
-            <a:ext cx="5469591" cy="675861"/>
+            <a:off x="1140239" y="402781"/>
+            <a:ext cx="9868451" cy="675861"/>
           </a:xfrm>
         </p:spPr>
         <p:txBody>
@@ -11565,6 +11653,7 @@
           </a:bodyPr>
           <a:lstStyle/>
           <a:p>
+            <a:pPr algn="ctr"/>
             <a:r>
               <a:rPr lang="en-US" dirty="0"/>
               <a:t>Data Cleaning</a:t>
@@ -11629,19 +11718,29 @@
               </a:ext>
             </a:extLst>
           </a:blip>
-          <a:srcRect l="-1117" t="-3971" r="21253" b="3971"/>
+          <a:srcRect l="-1117" t="-3970" r="21253" b="-652"/>
           <a:stretch>
             <a:fillRect/>
           </a:stretch>
         </p:blipFill>
         <p:spPr>
           <a:xfrm>
-            <a:off x="1340748" y="1358219"/>
-            <a:ext cx="9234487" cy="4571817"/>
+            <a:off x="1053548" y="1078642"/>
+            <a:ext cx="9868451" cy="5111515"/>
           </a:xfrm>
           <a:prstGeom prst="rect">
             <a:avLst/>
           </a:prstGeom>
+          <a:ln>
+            <a:noFill/>
+          </a:ln>
+          <a:effectLst>
+            <a:outerShdw blurRad="190500" algn="tl" rotWithShape="0">
+              <a:srgbClr val="000000">
+                <a:alpha val="70000"/>
+              </a:srgbClr>
+            </a:outerShdw>
+          </a:effectLst>
         </p:spPr>
       </p:pic>
     </p:spTree>
@@ -12052,8 +12151,8 @@
         </p:nvSpPr>
         <p:spPr>
           <a:xfrm>
-            <a:off x="3004930" y="411132"/>
-            <a:ext cx="6182139" cy="675861"/>
+            <a:off x="308113" y="311741"/>
+            <a:ext cx="11569148" cy="675861"/>
           </a:xfrm>
         </p:spPr>
         <p:txBody>
@@ -12062,6 +12161,7 @@
           </a:bodyPr>
           <a:lstStyle/>
           <a:p>
+            <a:pPr algn="ctr"/>
             <a:r>
               <a:rPr lang="en-US" dirty="0"/>
               <a:t>Exploratory Data Analysis</a:t>
@@ -12126,18 +12226,29 @@
               </a:ext>
             </a:extLst>
           </a:blip>
+          <a:srcRect t="-144" b="3063"/>
           <a:stretch>
             <a:fillRect/>
           </a:stretch>
         </p:blipFill>
         <p:spPr>
           <a:xfrm>
-            <a:off x="2196548" y="1094723"/>
-            <a:ext cx="7841974" cy="5381478"/>
+            <a:off x="2069989" y="987602"/>
+            <a:ext cx="8045395" cy="5359875"/>
           </a:xfrm>
           <a:prstGeom prst="rect">
             <a:avLst/>
           </a:prstGeom>
+          <a:ln>
+            <a:noFill/>
+          </a:ln>
+          <a:effectLst>
+            <a:outerShdw blurRad="190500" algn="tl" rotWithShape="0">
+              <a:srgbClr val="000000">
+                <a:alpha val="70000"/>
+              </a:srgbClr>
+            </a:outerShdw>
+          </a:effectLst>
         </p:spPr>
       </p:pic>
     </p:spTree>
@@ -12213,10 +12324,10 @@
       </p:sp>
       <p:pic>
         <p:nvPicPr>
-          <p:cNvPr id="5" name="Picture 4">
-            <a:extLst>
-              <a:ext uri="{FF2B5EF4-FFF2-40B4-BE49-F238E27FC236}">
-                <a16:creationId xmlns:a16="http://schemas.microsoft.com/office/drawing/2014/main" id="{CD53CE37-B0FE-4613-06A1-3A824C79C388}"/>
+          <p:cNvPr id="11" name="Picture 10">
+            <a:extLst>
+              <a:ext uri="{FF2B5EF4-FFF2-40B4-BE49-F238E27FC236}">
+                <a16:creationId xmlns:a16="http://schemas.microsoft.com/office/drawing/2014/main" id="{A5B161B9-33AD-CC3B-E2A7-947172448017}"/>
               </a:ext>
             </a:extLst>
           </p:cNvPr>
@@ -12226,82 +12337,14 @@
           <p:nvPr/>
         </p:nvPicPr>
         <p:blipFill>
-          <a:blip r:embed="rId2">
-            <a:extLst>
-              <a:ext uri="{28A0092B-C50C-407E-A947-70E740481C1C}">
-                <a14:useLocalDpi xmlns:a14="http://schemas.microsoft.com/office/drawing/2010/main" val="0"/>
-              </a:ext>
-            </a:extLst>
-          </a:blip>
-          <a:srcRect t="1" r="48979" b="49299"/>
+          <a:blip r:embed="rId2"/>
           <a:stretch>
             <a:fillRect/>
           </a:stretch>
         </p:blipFill>
         <p:spPr>
           <a:xfrm>
-            <a:off x="7858540" y="407181"/>
-            <a:ext cx="3481192" cy="3071191"/>
-          </a:xfrm>
-          <a:prstGeom prst="rect">
-            <a:avLst/>
-          </a:prstGeom>
-        </p:spPr>
-      </p:pic>
-      <p:pic>
-        <p:nvPicPr>
-          <p:cNvPr id="10" name="Picture 9">
-            <a:extLst>
-              <a:ext uri="{FF2B5EF4-FFF2-40B4-BE49-F238E27FC236}">
-                <a16:creationId xmlns:a16="http://schemas.microsoft.com/office/drawing/2014/main" id="{ACD7A13E-0B75-0248-AFC7-8ED96CF1FBC0}"/>
-              </a:ext>
-            </a:extLst>
-          </p:cNvPr>
-          <p:cNvPicPr>
-            <a:picLocks noChangeAspect="1"/>
-          </p:cNvPicPr>
-          <p:nvPr/>
-        </p:nvPicPr>
-        <p:blipFill>
-          <a:blip r:embed="rId3"/>
-          <a:srcRect l="50622" r="342" b="53045"/>
-          <a:stretch>
-            <a:fillRect/>
-          </a:stretch>
-        </p:blipFill>
-        <p:spPr>
-          <a:xfrm>
-            <a:off x="7858539" y="3458494"/>
-            <a:ext cx="3481191" cy="2958144"/>
-          </a:xfrm>
-          <a:prstGeom prst="rect">
-            <a:avLst/>
-          </a:prstGeom>
-        </p:spPr>
-      </p:pic>
-      <p:pic>
-        <p:nvPicPr>
-          <p:cNvPr id="11" name="Picture 10">
-            <a:extLst>
-              <a:ext uri="{FF2B5EF4-FFF2-40B4-BE49-F238E27FC236}">
-                <a16:creationId xmlns:a16="http://schemas.microsoft.com/office/drawing/2014/main" id="{A5B161B9-33AD-CC3B-E2A7-947172448017}"/>
-              </a:ext>
-            </a:extLst>
-          </p:cNvPr>
-          <p:cNvPicPr>
-            <a:picLocks noChangeAspect="1"/>
-          </p:cNvPicPr>
-          <p:nvPr/>
-        </p:nvPicPr>
-        <p:blipFill>
-          <a:blip r:embed="rId3"/>
-          <a:stretch>
-            <a:fillRect/>
-          </a:stretch>
-        </p:blipFill>
-        <p:spPr>
-          <a:xfrm>
-            <a:off x="1268849" y="1465699"/>
+            <a:off x="1390176" y="1366308"/>
             <a:ext cx="5479064" cy="4862118"/>
           </a:xfrm>
           <a:prstGeom prst="rect">
@@ -12359,8 +12402,8 @@
         </p:nvSpPr>
         <p:spPr>
           <a:xfrm>
-            <a:off x="487018" y="407181"/>
-            <a:ext cx="7285381" cy="675861"/>
+            <a:off x="318052" y="407183"/>
+            <a:ext cx="7660655" cy="675861"/>
           </a:xfrm>
         </p:spPr>
         <p:txBody>
@@ -12369,6 +12412,7 @@
           </a:bodyPr>
           <a:lstStyle/>
           <a:p>
+            <a:pPr algn="ctr"/>
             <a:r>
               <a:rPr lang="en-US" dirty="0"/>
               <a:t>Bar Chart of Top 10 Influencers</a:t>
@@ -12376,6 +12420,46 @@
           </a:p>
         </p:txBody>
       </p:sp>
+      <p:pic>
+        <p:nvPicPr>
+          <p:cNvPr id="2" name="Picture 1">
+            <a:extLst>
+              <a:ext uri="{FF2B5EF4-FFF2-40B4-BE49-F238E27FC236}">
+                <a16:creationId xmlns:a16="http://schemas.microsoft.com/office/drawing/2014/main" id="{53A5930B-08CD-BD48-8077-B66D77A8D554}"/>
+              </a:ext>
+            </a:extLst>
+          </p:cNvPr>
+          <p:cNvPicPr>
+            <a:picLocks noChangeAspect="1"/>
+          </p:cNvPicPr>
+          <p:nvPr/>
+        </p:nvPicPr>
+        <p:blipFill>
+          <a:blip r:embed="rId3"/>
+          <a:stretch>
+            <a:fillRect/>
+          </a:stretch>
+        </p:blipFill>
+        <p:spPr>
+          <a:xfrm>
+            <a:off x="7978707" y="413472"/>
+            <a:ext cx="3481118" cy="6011177"/>
+          </a:xfrm>
+          <a:prstGeom prst="rect">
+            <a:avLst/>
+          </a:prstGeom>
+          <a:ln>
+            <a:noFill/>
+          </a:ln>
+          <a:effectLst>
+            <a:outerShdw blurRad="292100" dist="139700" dir="2700000" algn="tl" rotWithShape="0">
+              <a:srgbClr val="333333">
+                <a:alpha val="65000"/>
+              </a:srgbClr>
+            </a:outerShdw>
+          </a:effectLst>
+        </p:spPr>
+      </p:pic>
     </p:spTree>
     <p:extLst>
       <p:ext uri="{BB962C8B-B14F-4D97-AF65-F5344CB8AC3E}">
@@ -13201,35 +13285,6 @@
 </file>
 
 <file path=customXml/item1.xml><?xml version="1.0" encoding="utf-8"?>
-<p:properties xmlns:p="http://schemas.microsoft.com/office/2006/metadata/properties" xmlns:xsi="http://www.w3.org/2001/XMLSchema-instance" xmlns:pc="http://schemas.microsoft.com/office/infopath/2007/PartnerControls">
-  <documentManagement>
-    <_ip_UnifiedCompliancePolicyUIAction xmlns="http://schemas.microsoft.com/sharepoint/v3" xsi:nil="true"/>
-    <Image xmlns="71af3243-3dd4-4a8d-8c0d-dd76da1f02a5">
-      <Url xsi:nil="true"/>
-      <Description xsi:nil="true"/>
-    </Image>
-    <Status xmlns="71af3243-3dd4-4a8d-8c0d-dd76da1f02a5">Not started</Status>
-    <Background xmlns="71af3243-3dd4-4a8d-8c0d-dd76da1f02a5">false</Background>
-    <_ip_UnifiedCompliancePolicyProperties xmlns="http://schemas.microsoft.com/sharepoint/v3" xsi:nil="true"/>
-    <ImageTagsTaxHTField xmlns="71af3243-3dd4-4a8d-8c0d-dd76da1f02a5">
-      <Terms xmlns="http://schemas.microsoft.com/office/infopath/2007/PartnerControls"/>
-    </ImageTagsTaxHTField>
-    <TaxCatchAll xmlns="230e9df3-be65-4c73-a93b-d1236ebd677e" xsi:nil="true"/>
-    <MediaServiceKeyPoints xmlns="71af3243-3dd4-4a8d-8c0d-dd76da1f02a5" xsi:nil="true"/>
-  </documentManagement>
-</p:properties>
-</file>
-
-<file path=customXml/item2.xml><?xml version="1.0" encoding="utf-8"?>
-<?mso-contentType ?>
-<FormTemplates xmlns="http://schemas.microsoft.com/sharepoint/v3/contenttype/forms">
-  <Display>DocumentLibraryForm</Display>
-  <Edit>DocumentLibraryForm</Edit>
-  <New>DocumentLibraryForm</New>
-</FormTemplates>
-</file>
-
-<file path=customXml/item3.xml><?xml version="1.0" encoding="utf-8"?>
 <ct:contentTypeSchema xmlns:ct="http://schemas.microsoft.com/office/2006/metadata/contentType" xmlns:ma="http://schemas.microsoft.com/office/2006/metadata/properties/metaAttributes" ct:_="" ma:_="" ma:contentTypeName="Document" ma:contentTypeID="0x01010079F111ED35F8CC479449609E8A0923A6" ma:contentTypeVersion="28" ma:contentTypeDescription="Create a new document." ma:contentTypeScope="" ma:versionID="60f5a4f2d2b0abadcf532d48ebf9cb71">
   <xsd:schema xmlns:xsd="http://www.w3.org/2001/XMLSchema" xmlns:xs="http://www.w3.org/2001/XMLSchema" xmlns:p="http://schemas.microsoft.com/office/2006/metadata/properties" xmlns:ns1="http://schemas.microsoft.com/sharepoint/v3" xmlns:ns2="71af3243-3dd4-4a8d-8c0d-dd76da1f02a5" xmlns:ns3="16c05727-aa75-4e4a-9b5f-8a80a1165891" xmlns:ns4="230e9df3-be65-4c73-a93b-d1236ebd677e" targetNamespace="http://schemas.microsoft.com/office/2006/metadata/properties" ma:root="true" ma:fieldsID="7dd78129e6a1811f84807ad11c651531" ns1:_="" ns2:_="" ns3:_="" ns4:_="">
     <xsd:import namespace="http://schemas.microsoft.com/sharepoint/v3"/>
@@ -13541,27 +13596,36 @@
 </ct:contentTypeSchema>
 </file>
 
-<file path=customXml/itemProps1.xml><?xml version="1.0" encoding="utf-8"?>
-<ds:datastoreItem xmlns:ds="http://schemas.openxmlformats.org/officeDocument/2006/customXml" ds:itemID="{804A2E04-D8A3-4CD6-A49A-4E88613CFB20}">
-  <ds:schemaRefs>
-    <ds:schemaRef ds:uri="http://schemas.microsoft.com/office/2006/metadata/properties"/>
-    <ds:schemaRef ds:uri="http://schemas.microsoft.com/office/infopath/2007/PartnerControls"/>
-    <ds:schemaRef ds:uri="http://schemas.microsoft.com/sharepoint/v3"/>
-    <ds:schemaRef ds:uri="71af3243-3dd4-4a8d-8c0d-dd76da1f02a5"/>
-    <ds:schemaRef ds:uri="230e9df3-be65-4c73-a93b-d1236ebd677e"/>
-  </ds:schemaRefs>
-</ds:datastoreItem>
+<file path=customXml/item2.xml><?xml version="1.0" encoding="utf-8"?>
+<?mso-contentType ?>
+<FormTemplates xmlns="http://schemas.microsoft.com/sharepoint/v3/contenttype/forms">
+  <Display>DocumentLibraryForm</Display>
+  <Edit>DocumentLibraryForm</Edit>
+  <New>DocumentLibraryForm</New>
+</FormTemplates>
 </file>
 
-<file path=customXml/itemProps2.xml><?xml version="1.0" encoding="utf-8"?>
-<ds:datastoreItem xmlns:ds="http://schemas.openxmlformats.org/officeDocument/2006/customXml" ds:itemID="{7A6AD6DB-9470-4861-90FA-528B22606C3A}">
-  <ds:schemaRefs>
-    <ds:schemaRef ds:uri="http://schemas.microsoft.com/sharepoint/v3/contenttype/forms"/>
-  </ds:schemaRefs>
-</ds:datastoreItem>
+<file path=customXml/item3.xml><?xml version="1.0" encoding="utf-8"?>
+<p:properties xmlns:p="http://schemas.microsoft.com/office/2006/metadata/properties" xmlns:xsi="http://www.w3.org/2001/XMLSchema-instance" xmlns:pc="http://schemas.microsoft.com/office/infopath/2007/PartnerControls">
+  <documentManagement>
+    <_ip_UnifiedCompliancePolicyUIAction xmlns="http://schemas.microsoft.com/sharepoint/v3" xsi:nil="true"/>
+    <Image xmlns="71af3243-3dd4-4a8d-8c0d-dd76da1f02a5">
+      <Url xsi:nil="true"/>
+      <Description xsi:nil="true"/>
+    </Image>
+    <Status xmlns="71af3243-3dd4-4a8d-8c0d-dd76da1f02a5">Not started</Status>
+    <Background xmlns="71af3243-3dd4-4a8d-8c0d-dd76da1f02a5">false</Background>
+    <_ip_UnifiedCompliancePolicyProperties xmlns="http://schemas.microsoft.com/sharepoint/v3" xsi:nil="true"/>
+    <ImageTagsTaxHTField xmlns="71af3243-3dd4-4a8d-8c0d-dd76da1f02a5">
+      <Terms xmlns="http://schemas.microsoft.com/office/infopath/2007/PartnerControls"/>
+    </ImageTagsTaxHTField>
+    <TaxCatchAll xmlns="230e9df3-be65-4c73-a93b-d1236ebd677e" xsi:nil="true"/>
+    <MediaServiceKeyPoints xmlns="71af3243-3dd4-4a8d-8c0d-dd76da1f02a5" xsi:nil="true"/>
+  </documentManagement>
+</p:properties>
 </file>
 
-<file path=customXml/itemProps3.xml><?xml version="1.0" encoding="utf-8"?>
+<file path=customXml/itemProps1.xml><?xml version="1.0" encoding="utf-8"?>
 <ds:datastoreItem xmlns:ds="http://schemas.openxmlformats.org/officeDocument/2006/customXml" ds:itemID="{D5A97A83-19EA-4F1C-BA10-74DE0010968C}">
   <ds:schemaRefs>
     <ds:schemaRef ds:uri="http://schemas.microsoft.com/office/2006/metadata/contentType"/>
@@ -13582,6 +13646,26 @@
 </ds:datastoreItem>
 </file>
 
+<file path=customXml/itemProps2.xml><?xml version="1.0" encoding="utf-8"?>
+<ds:datastoreItem xmlns:ds="http://schemas.openxmlformats.org/officeDocument/2006/customXml" ds:itemID="{7A6AD6DB-9470-4861-90FA-528B22606C3A}">
+  <ds:schemaRefs>
+    <ds:schemaRef ds:uri="http://schemas.microsoft.com/sharepoint/v3/contenttype/forms"/>
+  </ds:schemaRefs>
+</ds:datastoreItem>
+</file>
+
+<file path=customXml/itemProps3.xml><?xml version="1.0" encoding="utf-8"?>
+<ds:datastoreItem xmlns:ds="http://schemas.openxmlformats.org/officeDocument/2006/customXml" ds:itemID="{804A2E04-D8A3-4CD6-A49A-4E88613CFB20}">
+  <ds:schemaRefs>
+    <ds:schemaRef ds:uri="http://schemas.microsoft.com/office/2006/metadata/properties"/>
+    <ds:schemaRef ds:uri="http://schemas.microsoft.com/office/infopath/2007/PartnerControls"/>
+    <ds:schemaRef ds:uri="http://schemas.microsoft.com/sharepoint/v3"/>
+    <ds:schemaRef ds:uri="71af3243-3dd4-4a8d-8c0d-dd76da1f02a5"/>
+    <ds:schemaRef ds:uri="230e9df3-be65-4c73-a93b-d1236ebd677e"/>
+  </ds:schemaRefs>
+</ds:datastoreItem>
+</file>
+
 <file path=docMetadata/LabelInfo.xml><?xml version="1.0" encoding="utf-8"?>
 <clbl:labelList xmlns:clbl="http://schemas.microsoft.com/office/2020/mipLabelMetadata"/>
 </file>
</xml_diff>